<commit_message>
add note to set chm security checkbox
</commit_message>
<xml_diff>
--- a/content/pages/images/accept_security.pptx
+++ b/content/pages/images/accept_security.pptx
@@ -104,6 +104,11 @@
       </a:defRPr>
     </a:lvl9pPr>
   </p:defaultTextStyle>
+  <p:extLst>
+    <p:ext uri="{EFAFB233-063F-42B5-8137-9DF3F51BA10A}">
+      <p15:sldGuideLst xmlns:p15="http://schemas.microsoft.com/office/powerpoint/2012/main"/>
+    </p:ext>
+  </p:extLst>
 </p:presentation>
 </file>
 
@@ -3349,6 +3354,13 @@
           <a:prstGeom prst="rect">
             <a:avLst/>
           </a:prstGeom>
+          <a:effectLst>
+            <a:outerShdw blurRad="50800" dist="38100" dir="2700000" algn="tl" rotWithShape="0">
+              <a:prstClr val="black">
+                <a:alpha val="40000"/>
+              </a:prstClr>
+            </a:outerShdw>
+          </a:effectLst>
         </p:spPr>
       </p:pic>
       <p:sp>

</xml_diff>